<commit_message>
- PPT update - List order minor fixes
</commit_message>
<xml_diff>
--- a/WaCar.pptx
+++ b/WaCar.pptx
@@ -5,7 +5,7 @@
     <p:sldMasterId id="2147483684" r:id="rId4"/>
   </p:sldMasterIdLst>
   <p:notesMasterIdLst>
-    <p:notesMasterId r:id="rId17"/>
+    <p:notesMasterId r:id="rId18"/>
   </p:notesMasterIdLst>
   <p:sldIdLst>
     <p:sldId id="256" r:id="rId5"/>
@@ -20,6 +20,7 @@
     <p:sldId id="264" r:id="rId14"/>
     <p:sldId id="281" r:id="rId15"/>
     <p:sldId id="265" r:id="rId16"/>
+    <p:sldId id="282" r:id="rId17"/>
   </p:sldIdLst>
   <p:sldSz cx="12192000" cy="6858000"/>
   <p:notesSz cx="6858000" cy="9144000"/>
@@ -126,6 +127,14 @@
 </p:presentation>
 </file>
 
+<file path=ppt/revisionInfo.xml><?xml version="1.0" encoding="utf-8"?>
+<p1510:revInfo xmlns:a="http://schemas.openxmlformats.org/drawingml/2006/main" xmlns:r="http://schemas.openxmlformats.org/officeDocument/2006/relationships" xmlns:p1510="http://schemas.microsoft.com/office/powerpoint/2015/10/main">
+  <p1510:revLst>
+    <p1510:client id="{603A4F43-A9F8-442F-9341-874958BDA8FB}" v="1" dt="2024-06-07T14:28:21.849"/>
+  </p1510:revLst>
+</p1510:revInfo>
+</file>
+
 <file path=ppt/notesMasters/notesMaster1.xml><?xml version="1.0" encoding="utf-8"?>
 <p:notesMaster xmlns:a="http://schemas.openxmlformats.org/drawingml/2006/main" xmlns:r="http://schemas.openxmlformats.org/officeDocument/2006/relationships" xmlns:p="http://schemas.openxmlformats.org/presentationml/2006/main">
   <p:cSld>
@@ -208,7 +217,7 @@
           <a:p>
             <a:fld id="{EB084C20-C73A-40CE-AFFB-E5A6E9A09CDA}" type="datetimeFigureOut">
               <a:rPr lang="it-IT" smtClean="0"/>
-              <a:t>06/06/2024</a:t>
+              <a:t>07/06/2024</a:t>
             </a:fld>
             <a:endParaRPr lang="it-IT"/>
           </a:p>
@@ -691,7 +700,7 @@
           <a:p>
             <a:fld id="{716563A5-5042-4400-A102-0AEF26D25570}" type="datetime1">
               <a:rPr lang="it-IT" smtClean="0"/>
-              <a:t>06/06/2024</a:t>
+              <a:t>07/06/2024</a:t>
             </a:fld>
             <a:endParaRPr lang="it-IT"/>
           </a:p>
@@ -861,7 +870,7 @@
           <a:p>
             <a:fld id="{7960278F-A204-4C6B-AD88-BEE8450D5FF4}" type="datetime1">
               <a:rPr lang="it-IT" smtClean="0"/>
-              <a:t>06/06/2024</a:t>
+              <a:t>07/06/2024</a:t>
             </a:fld>
             <a:endParaRPr lang="it-IT"/>
           </a:p>
@@ -1041,7 +1050,7 @@
           <a:p>
             <a:fld id="{3626C1E0-4099-402C-A241-4ACC21A2C681}" type="datetime1">
               <a:rPr lang="it-IT" smtClean="0"/>
-              <a:t>06/06/2024</a:t>
+              <a:t>07/06/2024</a:t>
             </a:fld>
             <a:endParaRPr lang="it-IT"/>
           </a:p>
@@ -1211,7 +1220,7 @@
           <a:p>
             <a:fld id="{29E24CBB-81FE-4E15-82FE-06D74E229BD7}" type="datetime1">
               <a:rPr lang="it-IT" smtClean="0"/>
-              <a:t>06/06/2024</a:t>
+              <a:t>07/06/2024</a:t>
             </a:fld>
             <a:endParaRPr lang="it-IT"/>
           </a:p>
@@ -1457,7 +1466,7 @@
           <a:p>
             <a:fld id="{320008DC-BF36-475B-8BAA-EB1B96426DAA}" type="datetime1">
               <a:rPr lang="it-IT" smtClean="0"/>
-              <a:t>06/06/2024</a:t>
+              <a:t>07/06/2024</a:t>
             </a:fld>
             <a:endParaRPr lang="it-IT"/>
           </a:p>
@@ -1689,7 +1698,7 @@
           <a:p>
             <a:fld id="{5195E9AF-D275-4EDC-8E5B-91202E2D6359}" type="datetime1">
               <a:rPr lang="it-IT" smtClean="0"/>
-              <a:t>06/06/2024</a:t>
+              <a:t>07/06/2024</a:t>
             </a:fld>
             <a:endParaRPr lang="it-IT"/>
           </a:p>
@@ -2056,7 +2065,7 @@
           <a:p>
             <a:fld id="{1F8906FC-37E7-42C2-9937-A1FF63807AEA}" type="datetime1">
               <a:rPr lang="it-IT" smtClean="0"/>
-              <a:t>06/06/2024</a:t>
+              <a:t>07/06/2024</a:t>
             </a:fld>
             <a:endParaRPr lang="it-IT"/>
           </a:p>
@@ -2174,7 +2183,7 @@
           <a:p>
             <a:fld id="{EECEB948-3B89-449F-B83C-73E528B0FB59}" type="datetime1">
               <a:rPr lang="it-IT" smtClean="0"/>
-              <a:t>06/06/2024</a:t>
+              <a:t>07/06/2024</a:t>
             </a:fld>
             <a:endParaRPr lang="it-IT"/>
           </a:p>
@@ -2269,7 +2278,7 @@
           <a:p>
             <a:fld id="{140A3494-F64A-421F-BA23-E98B1E94489C}" type="datetime1">
               <a:rPr lang="it-IT" smtClean="0"/>
-              <a:t>06/06/2024</a:t>
+              <a:t>07/06/2024</a:t>
             </a:fld>
             <a:endParaRPr lang="it-IT"/>
           </a:p>
@@ -2546,7 +2555,7 @@
           <a:p>
             <a:fld id="{FA751072-EE9A-41DC-B488-93901E8A09E9}" type="datetime1">
               <a:rPr lang="it-IT" smtClean="0"/>
-              <a:t>06/06/2024</a:t>
+              <a:t>07/06/2024</a:t>
             </a:fld>
             <a:endParaRPr lang="it-IT"/>
           </a:p>
@@ -2803,7 +2812,7 @@
           <a:p>
             <a:fld id="{D03C8101-077A-4389-B764-789DA6B3543D}" type="datetime1">
               <a:rPr lang="it-IT" smtClean="0"/>
-              <a:t>06/06/2024</a:t>
+              <a:t>07/06/2024</a:t>
             </a:fld>
             <a:endParaRPr lang="it-IT"/>
           </a:p>
@@ -3016,7 +3025,7 @@
           <a:p>
             <a:fld id="{3FB577B0-449C-451E-9F44-FD3474700A58}" type="datetime1">
               <a:rPr lang="it-IT" smtClean="0"/>
-              <a:t>06/06/2024</a:t>
+              <a:t>07/06/2024</a:t>
             </a:fld>
             <a:endParaRPr lang="it-IT"/>
           </a:p>
@@ -4880,6 +4889,325 @@
 </p:sld>
 </file>
 
+<file path=ppt/slides/slide13.xml><?xml version="1.0" encoding="utf-8"?>
+<p:sld xmlns:a="http://schemas.openxmlformats.org/drawingml/2006/main" xmlns:r="http://schemas.openxmlformats.org/officeDocument/2006/relationships" xmlns:p="http://schemas.openxmlformats.org/presentationml/2006/main">
+  <p:cSld>
+    <p:bg>
+      <p:bgPr>
+        <a:solidFill>
+          <a:srgbClr val="1C1C1E"/>
+        </a:solidFill>
+        <a:effectLst/>
+      </p:bgPr>
+    </p:bg>
+    <p:spTree>
+      <p:nvGrpSpPr>
+        <p:cNvPr id="1" name=""/>
+        <p:cNvGrpSpPr/>
+        <p:nvPr/>
+      </p:nvGrpSpPr>
+      <p:grpSpPr>
+        <a:xfrm>
+          <a:off x="0" y="0"/>
+          <a:ext cx="0" cy="0"/>
+          <a:chOff x="0" y="0"/>
+          <a:chExt cx="0" cy="0"/>
+        </a:xfrm>
+      </p:grpSpPr>
+      <p:sp>
+        <p:nvSpPr>
+          <p:cNvPr id="2" name="Title 1">
+            <a:extLst>
+              <a:ext uri="{FF2B5EF4-FFF2-40B4-BE49-F238E27FC236}">
+                <a16:creationId xmlns:a16="http://schemas.microsoft.com/office/drawing/2014/main" id="{F4E180E6-08BE-E85C-0594-55C5DF7ED010}"/>
+              </a:ext>
+            </a:extLst>
+          </p:cNvPr>
+          <p:cNvSpPr>
+            <a:spLocks noGrp="1"/>
+          </p:cNvSpPr>
+          <p:nvPr>
+            <p:ph type="title"/>
+          </p:nvPr>
+        </p:nvSpPr>
+        <p:spPr/>
+        <p:txBody>
+          <a:bodyPr/>
+          <a:lstStyle/>
+          <a:p>
+            <a:r>
+              <a:rPr lang="it-IT" dirty="0" err="1">
+                <a:solidFill>
+                  <a:srgbClr val="D76464"/>
+                </a:solidFill>
+                <a:latin typeface="Audiowide" panose="02000503000000020004" pitchFamily="2" charset="0"/>
+              </a:rPr>
+              <a:t>Contributions</a:t>
+            </a:r>
+            <a:endParaRPr lang="it-IT" dirty="0">
+              <a:solidFill>
+                <a:srgbClr val="D76464"/>
+              </a:solidFill>
+              <a:latin typeface="Audiowide" panose="02000503000000020004" pitchFamily="2" charset="0"/>
+            </a:endParaRPr>
+          </a:p>
+        </p:txBody>
+      </p:sp>
+      <p:sp>
+        <p:nvSpPr>
+          <p:cNvPr id="3" name="Content Placeholder 2">
+            <a:extLst>
+              <a:ext uri="{FF2B5EF4-FFF2-40B4-BE49-F238E27FC236}">
+                <a16:creationId xmlns:a16="http://schemas.microsoft.com/office/drawing/2014/main" id="{E5F409E9-ED7C-77C6-E102-E717C57B99DE}"/>
+              </a:ext>
+            </a:extLst>
+          </p:cNvPr>
+          <p:cNvSpPr>
+            <a:spLocks noGrp="1"/>
+          </p:cNvSpPr>
+          <p:nvPr>
+            <p:ph idx="1"/>
+          </p:nvPr>
+        </p:nvSpPr>
+        <p:spPr/>
+        <p:txBody>
+          <a:bodyPr>
+            <a:normAutofit/>
+          </a:bodyPr>
+          <a:lstStyle/>
+          <a:p>
+            <a:r>
+              <a:rPr lang="it-IT" sz="1800" dirty="0">
+                <a:solidFill>
+                  <a:schemeClr val="bg1"/>
+                </a:solidFill>
+                <a:latin typeface="Audiowide" panose="02000503000000020004" pitchFamily="2" charset="0"/>
+              </a:rPr>
+              <a:t>Di Martino Ludovico: </a:t>
+            </a:r>
+            <a:r>
+              <a:rPr lang="en-US" sz="1800" dirty="0">
+                <a:solidFill>
+                  <a:schemeClr val="bg1"/>
+                </a:solidFill>
+                <a:latin typeface="Audiowide" panose="02000503000000020004" pitchFamily="2" charset="0"/>
+              </a:rPr>
+              <a:t>developed the frontend of the admin section and the order recap modal for the basic user. Created and added the favicon and the logo on all the pages of the website.</a:t>
+            </a:r>
+          </a:p>
+          <a:p>
+            <a:r>
+              <a:rPr lang="en-US" sz="1800" dirty="0">
+                <a:solidFill>
+                  <a:schemeClr val="bg1"/>
+                </a:solidFill>
+                <a:latin typeface="Audiowide" panose="02000503000000020004" pitchFamily="2" charset="0"/>
+              </a:rPr>
+              <a:t>Scapinello Michele: developed the frontend of the list order page and the delete order modal and servlet. Development of the footer and part of the navbar. Preparation of the slides.</a:t>
+            </a:r>
+            <a:endParaRPr lang="it-IT" sz="1800" dirty="0">
+              <a:solidFill>
+                <a:schemeClr val="bg1"/>
+              </a:solidFill>
+              <a:latin typeface="Audiowide" panose="02000503000000020004" pitchFamily="2" charset="0"/>
+            </a:endParaRPr>
+          </a:p>
+        </p:txBody>
+      </p:sp>
+      <p:sp>
+        <p:nvSpPr>
+          <p:cNvPr id="6" name="Slide Number Placeholder 14">
+            <a:extLst>
+              <a:ext uri="{FF2B5EF4-FFF2-40B4-BE49-F238E27FC236}">
+                <a16:creationId xmlns:a16="http://schemas.microsoft.com/office/drawing/2014/main" id="{EBDE457B-96A4-526C-68D9-F8425C3F680B}"/>
+              </a:ext>
+            </a:extLst>
+          </p:cNvPr>
+          <p:cNvSpPr txBox="1">
+            <a:spLocks/>
+          </p:cNvSpPr>
+          <p:nvPr/>
+        </p:nvSpPr>
+        <p:spPr>
+          <a:xfrm>
+            <a:off x="11802358" y="6346760"/>
+            <a:ext cx="389641" cy="365125"/>
+          </a:xfrm>
+          <a:prstGeom prst="rect">
+            <a:avLst/>
+          </a:prstGeom>
+        </p:spPr>
+        <p:txBody>
+          <a:bodyPr vert="horz" lIns="91440" tIns="45720" rIns="91440" bIns="45720" rtlCol="0" anchor="ctr"/>
+          <a:lstStyle>
+            <a:defPPr>
+              <a:defRPr lang="en-US"/>
+            </a:defPPr>
+            <a:lvl1pPr marL="0" algn="r" defTabSz="457200" rtl="0" eaLnBrk="1" latinLnBrk="0" hangingPunct="1">
+              <a:defRPr sz="1200" kern="1200">
+                <a:solidFill>
+                  <a:schemeClr val="tx1">
+                    <a:tint val="82000"/>
+                  </a:schemeClr>
+                </a:solidFill>
+                <a:latin typeface="+mn-lt"/>
+                <a:ea typeface="+mn-ea"/>
+                <a:cs typeface="+mn-cs"/>
+              </a:defRPr>
+            </a:lvl1pPr>
+            <a:lvl2pPr marL="457200" algn="l" defTabSz="457200" rtl="0" eaLnBrk="1" latinLnBrk="0" hangingPunct="1">
+              <a:defRPr sz="1800" kern="1200">
+                <a:solidFill>
+                  <a:schemeClr val="tx1"/>
+                </a:solidFill>
+                <a:latin typeface="+mn-lt"/>
+                <a:ea typeface="+mn-ea"/>
+                <a:cs typeface="+mn-cs"/>
+              </a:defRPr>
+            </a:lvl2pPr>
+            <a:lvl3pPr marL="914400" algn="l" defTabSz="457200" rtl="0" eaLnBrk="1" latinLnBrk="0" hangingPunct="1">
+              <a:defRPr sz="1800" kern="1200">
+                <a:solidFill>
+                  <a:schemeClr val="tx1"/>
+                </a:solidFill>
+                <a:latin typeface="+mn-lt"/>
+                <a:ea typeface="+mn-ea"/>
+                <a:cs typeface="+mn-cs"/>
+              </a:defRPr>
+            </a:lvl3pPr>
+            <a:lvl4pPr marL="1371600" algn="l" defTabSz="457200" rtl="0" eaLnBrk="1" latinLnBrk="0" hangingPunct="1">
+              <a:defRPr sz="1800" kern="1200">
+                <a:solidFill>
+                  <a:schemeClr val="tx1"/>
+                </a:solidFill>
+                <a:latin typeface="+mn-lt"/>
+                <a:ea typeface="+mn-ea"/>
+                <a:cs typeface="+mn-cs"/>
+              </a:defRPr>
+            </a:lvl4pPr>
+            <a:lvl5pPr marL="1828800" algn="l" defTabSz="457200" rtl="0" eaLnBrk="1" latinLnBrk="0" hangingPunct="1">
+              <a:defRPr sz="1800" kern="1200">
+                <a:solidFill>
+                  <a:schemeClr val="tx1"/>
+                </a:solidFill>
+                <a:latin typeface="+mn-lt"/>
+                <a:ea typeface="+mn-ea"/>
+                <a:cs typeface="+mn-cs"/>
+              </a:defRPr>
+            </a:lvl5pPr>
+            <a:lvl6pPr marL="2286000" algn="l" defTabSz="457200" rtl="0" eaLnBrk="1" latinLnBrk="0" hangingPunct="1">
+              <a:defRPr sz="1800" kern="1200">
+                <a:solidFill>
+                  <a:schemeClr val="tx1"/>
+                </a:solidFill>
+                <a:latin typeface="+mn-lt"/>
+                <a:ea typeface="+mn-ea"/>
+                <a:cs typeface="+mn-cs"/>
+              </a:defRPr>
+            </a:lvl6pPr>
+            <a:lvl7pPr marL="2743200" algn="l" defTabSz="457200" rtl="0" eaLnBrk="1" latinLnBrk="0" hangingPunct="1">
+              <a:defRPr sz="1800" kern="1200">
+                <a:solidFill>
+                  <a:schemeClr val="tx1"/>
+                </a:solidFill>
+                <a:latin typeface="+mn-lt"/>
+                <a:ea typeface="+mn-ea"/>
+                <a:cs typeface="+mn-cs"/>
+              </a:defRPr>
+            </a:lvl7pPr>
+            <a:lvl8pPr marL="3200400" algn="l" defTabSz="457200" rtl="0" eaLnBrk="1" latinLnBrk="0" hangingPunct="1">
+              <a:defRPr sz="1800" kern="1200">
+                <a:solidFill>
+                  <a:schemeClr val="tx1"/>
+                </a:solidFill>
+                <a:latin typeface="+mn-lt"/>
+                <a:ea typeface="+mn-ea"/>
+                <a:cs typeface="+mn-cs"/>
+              </a:defRPr>
+            </a:lvl8pPr>
+            <a:lvl9pPr marL="3657600" algn="l" defTabSz="457200" rtl="0" eaLnBrk="1" latinLnBrk="0" hangingPunct="1">
+              <a:defRPr sz="1800" kern="1200">
+                <a:solidFill>
+                  <a:schemeClr val="tx1"/>
+                </a:solidFill>
+                <a:latin typeface="+mn-lt"/>
+                <a:ea typeface="+mn-ea"/>
+                <a:cs typeface="+mn-cs"/>
+              </a:defRPr>
+            </a:lvl9pPr>
+          </a:lstStyle>
+          <a:p>
+            <a:pPr algn="ctr"/>
+            <a:fld id="{A9EE5928-F148-40B0-A685-C3EA8FBFEFC2}" type="slidenum">
+              <a:rPr lang="it-IT" smtClean="0">
+                <a:solidFill>
+                  <a:schemeClr val="bg1"/>
+                </a:solidFill>
+              </a:rPr>
+              <a:pPr algn="ctr"/>
+              <a:t>13</a:t>
+            </a:fld>
+            <a:endParaRPr lang="it-IT" dirty="0">
+              <a:solidFill>
+                <a:schemeClr val="bg1"/>
+              </a:solidFill>
+            </a:endParaRPr>
+          </a:p>
+        </p:txBody>
+      </p:sp>
+      <p:sp>
+        <p:nvSpPr>
+          <p:cNvPr id="7" name="Footer Placeholder 13">
+            <a:extLst>
+              <a:ext uri="{FF2B5EF4-FFF2-40B4-BE49-F238E27FC236}">
+                <a16:creationId xmlns:a16="http://schemas.microsoft.com/office/drawing/2014/main" id="{FA48AF46-64C5-1BCC-074E-5CD46E33DA73}"/>
+              </a:ext>
+            </a:extLst>
+          </p:cNvPr>
+          <p:cNvSpPr>
+            <a:spLocks noGrp="1"/>
+          </p:cNvSpPr>
+          <p:nvPr>
+            <p:ph type="ftr" sz="quarter" idx="11"/>
+          </p:nvPr>
+        </p:nvSpPr>
+        <p:spPr>
+          <a:xfrm>
+            <a:off x="0" y="6711885"/>
+            <a:ext cx="12192000" cy="155542"/>
+          </a:xfrm>
+          <a:solidFill>
+            <a:srgbClr val="D76464"/>
+          </a:solidFill>
+        </p:spPr>
+        <p:txBody>
+          <a:bodyPr/>
+          <a:lstStyle/>
+          <a:p>
+            <a:pPr algn="r"/>
+            <a:endParaRPr lang="it-IT" dirty="0">
+              <a:solidFill>
+                <a:schemeClr val="bg1"/>
+              </a:solidFill>
+              <a:latin typeface="Abadi Extra Light" panose="020F0502020204030204" pitchFamily="34" charset="0"/>
+              <a:cs typeface="Helvetica" panose="020B0604020202020204" pitchFamily="34" charset="0"/>
+            </a:endParaRPr>
+          </a:p>
+        </p:txBody>
+      </p:sp>
+    </p:spTree>
+    <p:extLst>
+      <p:ext uri="{BB962C8B-B14F-4D97-AF65-F5344CB8AC3E}">
+        <p14:creationId xmlns:p14="http://schemas.microsoft.com/office/powerpoint/2010/main" val="3080051585"/>
+      </p:ext>
+    </p:extLst>
+  </p:cSld>
+  <p:clrMapOvr>
+    <a:masterClrMapping/>
+  </p:clrMapOvr>
+</p:sld>
+</file>
+
 <file path=ppt/slides/slide2.xml><?xml version="1.0" encoding="utf-8"?>
 <p:sld xmlns:a="http://schemas.openxmlformats.org/drawingml/2006/main" xmlns:r="http://schemas.openxmlformats.org/officeDocument/2006/relationships" xmlns:p="http://schemas.openxmlformats.org/presentationml/2006/main">
   <p:cSld>
@@ -6642,14 +6970,14 @@
             <p:ph idx="1"/>
             <p:extLst>
               <p:ext uri="{D42A27DB-BD31-4B8C-83A1-F6EECF244321}">
-                <p14:modId xmlns:p14="http://schemas.microsoft.com/office/powerpoint/2010/main" val="1414334369"/>
+                <p14:modId xmlns:p14="http://schemas.microsoft.com/office/powerpoint/2010/main" val="3531234753"/>
               </p:ext>
             </p:extLst>
           </p:nvPr>
         </p:nvGraphicFramePr>
         <p:xfrm>
           <a:off x="838200" y="1825625"/>
-          <a:ext cx="10515600" cy="2225040"/>
+          <a:ext cx="10515600" cy="3876040"/>
         </p:xfrm>
         <a:graphic>
           <a:graphicData uri="http://schemas.openxmlformats.org/drawingml/2006/table">
@@ -6799,7 +7127,7 @@
                       </a:r>
                       <a:r>
                         <a:rPr lang="it-IT" dirty="0" err="1"/>
-                        <a:t>complete|carType</a:t>
+                        <a:t>carType</a:t>
                       </a:r>
                       <a:r>
                         <a:rPr lang="it-IT" dirty="0"/>
@@ -6814,7 +7142,18 @@
                     <a:bodyPr/>
                     <a:lstStyle/>
                     <a:p>
-                      <a:endParaRPr lang="en-GB" noProof="0" dirty="0"/>
+                      <a:r>
+                        <a:rPr lang="en-GB" noProof="0" dirty="0"/>
+                        <a:t>GET Circuits based on {</a:t>
+                      </a:r>
+                      <a:r>
+                        <a:rPr lang="en-GB" noProof="0" dirty="0" err="1"/>
+                        <a:t>CarType</a:t>
+                      </a:r>
+                      <a:r>
+                        <a:rPr lang="en-GB" noProof="0" dirty="0"/>
+                        <a:t>}</a:t>
+                      </a:r>
                     </a:p>
                   </a:txBody>
                   <a:tcPr/>
@@ -6822,6 +7161,55 @@
                 <a:extLst>
                   <a:ext uri="{0D108BD9-81ED-4DB2-BD59-A6C34878D82A}">
                     <a16:rowId xmlns:a16="http://schemas.microsoft.com/office/drawing/2014/main" val="4118253690"/>
+                  </a:ext>
+                </a:extLst>
+              </a:tr>
+              <a:tr h="370840">
+                <a:tc>
+                  <a:txBody>
+                    <a:bodyPr/>
+                    <a:lstStyle/>
+                    <a:p>
+                      <a:r>
+                        <a:rPr lang="it-IT" dirty="0"/>
+                        <a:t>/</a:t>
+                      </a:r>
+                      <a:r>
+                        <a:rPr lang="it-IT" dirty="0" err="1"/>
+                        <a:t>rest</a:t>
+                      </a:r>
+                      <a:r>
+                        <a:rPr lang="it-IT" dirty="0"/>
+                        <a:t>/user/</a:t>
+                      </a:r>
+                      <a:r>
+                        <a:rPr lang="it-IT" dirty="0" err="1"/>
+                        <a:t>order</a:t>
+                      </a:r>
+                      <a:r>
+                        <a:rPr lang="it-IT" dirty="0"/>
+                        <a:t>/create/complete</a:t>
+                      </a:r>
+                    </a:p>
+                  </a:txBody>
+                  <a:tcPr/>
+                </a:tc>
+                <a:tc>
+                  <a:txBody>
+                    <a:bodyPr/>
+                    <a:lstStyle/>
+                    <a:p>
+                      <a:r>
+                        <a:rPr lang="en-GB" noProof="0" dirty="0"/>
+                        <a:t>Create the Order</a:t>
+                      </a:r>
+                    </a:p>
+                  </a:txBody>
+                  <a:tcPr/>
+                </a:tc>
+                <a:extLst>
+                  <a:ext uri="{0D108BD9-81ED-4DB2-BD59-A6C34878D82A}">
+                    <a16:rowId xmlns:a16="http://schemas.microsoft.com/office/drawing/2014/main" val="310144991"/>
                   </a:ext>
                 </a:extLst>
               </a:tr>
@@ -6935,7 +7323,7 @@
                       </a:r>
                       <a:r>
                         <a:rPr lang="it-IT" dirty="0" err="1"/>
-                        <a:t>add|delete|search</a:t>
+                        <a:t>add|delete</a:t>
                       </a:r>
                       <a:r>
                         <a:rPr lang="it-IT" dirty="0"/>
@@ -6952,7 +7340,7 @@
                     <a:p>
                       <a:r>
                         <a:rPr lang="it-IT" dirty="0"/>
-                        <a:t>CREATE/DELETE/SEARCH </a:t>
+                        <a:t>CREATE/DELETE </a:t>
                       </a:r>
                       <a:r>
                         <a:rPr lang="it-IT" dirty="0" err="1"/>
@@ -6978,7 +7366,34 @@
                     <a:bodyPr/>
                     <a:lstStyle/>
                     <a:p>
-                      <a:endParaRPr lang="it-IT" dirty="0"/>
+                      <a:r>
+                        <a:rPr lang="it-IT" dirty="0"/>
+                        <a:t>/</a:t>
+                      </a:r>
+                      <a:r>
+                        <a:rPr lang="it-IT" dirty="0" err="1"/>
+                        <a:t>rest</a:t>
+                      </a:r>
+                      <a:r>
+                        <a:rPr lang="it-IT" dirty="0"/>
+                        <a:t>/</a:t>
+                      </a:r>
+                      <a:r>
+                        <a:rPr lang="it-IT" dirty="0" err="1"/>
+                        <a:t>circuit</a:t>
+                      </a:r>
+                      <a:r>
+                        <a:rPr lang="it-IT" dirty="0"/>
+                        <a:t>/{</a:t>
+                      </a:r>
+                      <a:r>
+                        <a:rPr lang="it-IT" dirty="0" err="1"/>
+                        <a:t>circuitName</a:t>
+                      </a:r>
+                      <a:r>
+                        <a:rPr lang="it-IT" dirty="0"/>
+                        <a:t>}</a:t>
+                      </a:r>
                     </a:p>
                   </a:txBody>
                   <a:tcPr/>
@@ -6988,6 +7403,208 @@
                     <a:bodyPr/>
                     <a:lstStyle/>
                     <a:p>
+                      <a:r>
+                        <a:rPr lang="it-IT" dirty="0"/>
+                        <a:t>GET </a:t>
+                      </a:r>
+                      <a:r>
+                        <a:rPr lang="it-IT" dirty="0" err="1"/>
+                        <a:t>circuit</a:t>
+                      </a:r>
+                      <a:r>
+                        <a:rPr lang="it-IT" dirty="0"/>
+                        <a:t> with name={</a:t>
+                      </a:r>
+                      <a:r>
+                        <a:rPr lang="it-IT" dirty="0" err="1"/>
+                        <a:t>circuitName</a:t>
+                      </a:r>
+                      <a:r>
+                        <a:rPr lang="it-IT" dirty="0"/>
+                        <a:t>}</a:t>
+                      </a:r>
+                    </a:p>
+                  </a:txBody>
+                  <a:tcPr/>
+                </a:tc>
+                <a:extLst>
+                  <a:ext uri="{0D108BD9-81ED-4DB2-BD59-A6C34878D82A}">
+                    <a16:rowId xmlns:a16="http://schemas.microsoft.com/office/drawing/2014/main" val="1134149104"/>
+                  </a:ext>
+                </a:extLst>
+              </a:tr>
+              <a:tr h="370840">
+                <a:tc>
+                  <a:txBody>
+                    <a:bodyPr/>
+                    <a:lstStyle/>
+                    <a:p>
+                      <a:r>
+                        <a:rPr lang="it-IT" dirty="0"/>
+                        <a:t>/</a:t>
+                      </a:r>
+                      <a:r>
+                        <a:rPr lang="it-IT" dirty="0" err="1"/>
+                        <a:t>rest</a:t>
+                      </a:r>
+                      <a:r>
+                        <a:rPr lang="it-IT" dirty="0"/>
+                        <a:t>/car/{</a:t>
+                      </a:r>
+                      <a:r>
+                        <a:rPr lang="it-IT" dirty="0" err="1"/>
+                        <a:t>carBrand</a:t>
+                      </a:r>
+                      <a:r>
+                        <a:rPr lang="it-IT" dirty="0"/>
+                        <a:t>}/{</a:t>
+                      </a:r>
+                      <a:r>
+                        <a:rPr lang="it-IT" dirty="0" err="1"/>
+                        <a:t>carModal</a:t>
+                      </a:r>
+                      <a:r>
+                        <a:rPr lang="it-IT" dirty="0"/>
+                        <a:t>}</a:t>
+                      </a:r>
+                    </a:p>
+                  </a:txBody>
+                  <a:tcPr/>
+                </a:tc>
+                <a:tc>
+                  <a:txBody>
+                    <a:bodyPr/>
+                    <a:lstStyle/>
+                    <a:p>
+                      <a:r>
+                        <a:rPr lang="it-IT" dirty="0"/>
+                        <a:t>GET car with brand={</a:t>
+                      </a:r>
+                      <a:r>
+                        <a:rPr lang="it-IT" dirty="0" err="1"/>
+                        <a:t>carBrand</a:t>
+                      </a:r>
+                      <a:r>
+                        <a:rPr lang="it-IT" dirty="0"/>
+                        <a:t>} and </a:t>
+                      </a:r>
+                      <a:r>
+                        <a:rPr lang="it-IT" dirty="0" err="1"/>
+                        <a:t>modal</a:t>
+                      </a:r>
+                      <a:r>
+                        <a:rPr lang="it-IT" dirty="0"/>
+                        <a:t>={</a:t>
+                      </a:r>
+                      <a:r>
+                        <a:rPr lang="it-IT" dirty="0" err="1"/>
+                        <a:t>carModal</a:t>
+                      </a:r>
+                      <a:r>
+                        <a:rPr lang="it-IT" dirty="0"/>
+                        <a:t>}</a:t>
+                      </a:r>
+                    </a:p>
+                  </a:txBody>
+                  <a:tcPr/>
+                </a:tc>
+                <a:extLst>
+                  <a:ext uri="{0D108BD9-81ED-4DB2-BD59-A6C34878D82A}">
+                    <a16:rowId xmlns:a16="http://schemas.microsoft.com/office/drawing/2014/main" val="2269154348"/>
+                  </a:ext>
+                </a:extLst>
+              </a:tr>
+              <a:tr h="370840">
+                <a:tc>
+                  <a:txBody>
+                    <a:bodyPr/>
+                    <a:lstStyle/>
+                    <a:p>
+                      <a:r>
+                        <a:rPr lang="it-IT" dirty="0"/>
+                        <a:t>/</a:t>
+                      </a:r>
+                      <a:r>
+                        <a:rPr lang="it-IT" dirty="0" err="1"/>
+                        <a:t>rest</a:t>
+                      </a:r>
+                      <a:r>
+                        <a:rPr lang="it-IT" dirty="0"/>
+                        <a:t>/user/</a:t>
+                      </a:r>
+                      <a:r>
+                        <a:rPr lang="it-IT" dirty="0" err="1"/>
+                        <a:t>favourite</a:t>
+                      </a:r>
+                      <a:r>
+                        <a:rPr lang="it-IT" dirty="0"/>
+                        <a:t>/</a:t>
+                      </a:r>
+                      <a:r>
+                        <a:rPr lang="it-IT" dirty="0" err="1"/>
+                        <a:t>search</a:t>
+                      </a:r>
+                      <a:r>
+                        <a:rPr lang="it-IT" dirty="0"/>
+                        <a:t>/{</a:t>
+                      </a:r>
+                      <a:r>
+                        <a:rPr lang="it-IT" dirty="0" err="1"/>
+                        <a:t>circuitName</a:t>
+                      </a:r>
+                      <a:r>
+                        <a:rPr lang="it-IT" dirty="0"/>
+                        <a:t>}/{</a:t>
+                      </a:r>
+                      <a:r>
+                        <a:rPr lang="it-IT" dirty="0" err="1"/>
+                        <a:t>carBrand</a:t>
+                      </a:r>
+                      <a:r>
+                        <a:rPr lang="it-IT" dirty="0"/>
+                        <a:t>}/{</a:t>
+                      </a:r>
+                      <a:r>
+                        <a:rPr lang="it-IT" dirty="0" err="1"/>
+                        <a:t>carModel</a:t>
+                      </a:r>
+                      <a:r>
+                        <a:rPr lang="it-IT" dirty="0"/>
+                        <a:t>}</a:t>
+                      </a:r>
+                    </a:p>
+                  </a:txBody>
+                  <a:tcPr/>
+                </a:tc>
+                <a:tc>
+                  <a:txBody>
+                    <a:bodyPr/>
+                    <a:lstStyle/>
+                    <a:p>
+                      <a:r>
+                        <a:rPr lang="it-IT" dirty="0"/>
+                        <a:t>GET the </a:t>
+                      </a:r>
+                      <a:r>
+                        <a:rPr lang="it-IT" dirty="0" err="1"/>
+                        <a:t>favoruites</a:t>
+                      </a:r>
+                      <a:r>
+                        <a:rPr lang="it-IT" dirty="0"/>
+                        <a:t> with the </a:t>
+                      </a:r>
+                      <a:r>
+                        <a:rPr lang="it-IT" dirty="0" err="1"/>
+                        <a:t>selected</a:t>
+                      </a:r>
+                      <a:r>
+                        <a:rPr lang="it-IT" dirty="0"/>
+                        <a:t> </a:t>
+                      </a:r>
+                      <a:r>
+                        <a:rPr lang="it-IT" dirty="0" err="1"/>
+                        <a:t>values</a:t>
+                      </a:r>
                       <a:endParaRPr lang="it-IT" dirty="0"/>
                     </a:p>
                   </a:txBody>
@@ -6995,7 +7612,7 @@
                 </a:tc>
                 <a:extLst>
                   <a:ext uri="{0D108BD9-81ED-4DB2-BD59-A6C34878D82A}">
-                    <a16:rowId xmlns:a16="http://schemas.microsoft.com/office/drawing/2014/main" val="1134149104"/>
+                    <a16:rowId xmlns:a16="http://schemas.microsoft.com/office/drawing/2014/main" val="4270085380"/>
                   </a:ext>
                 </a:extLst>
               </a:tr>
@@ -10850,15 +11467,15 @@
 <file path=customXml/itemProps3.xml><?xml version="1.0" encoding="utf-8"?>
 <ds:datastoreItem xmlns:ds="http://schemas.openxmlformats.org/officeDocument/2006/customXml" ds:itemID="{FCF7F047-525A-4DFD-AFD0-1236460CC9D1}">
   <ds:schemaRefs>
+    <ds:schemaRef ds:uri="http://schemas.microsoft.com/office/2006/metadata/properties"/>
     <ds:schemaRef ds:uri="http://purl.org/dc/terms/"/>
-    <ds:schemaRef ds:uri="http://schemas.microsoft.com/office/2006/metadata/properties"/>
+    <ds:schemaRef ds:uri="http://purl.org/dc/dcmitype/"/>
+    <ds:schemaRef ds:uri="http://purl.org/dc/elements/1.1/"/>
     <ds:schemaRef ds:uri="http://schemas.microsoft.com/office/infopath/2007/PartnerControls"/>
-    <ds:schemaRef ds:uri="http://purl.org/dc/elements/1.1/"/>
     <ds:schemaRef ds:uri="http://schemas.microsoft.com/office/2006/documentManagement/types"/>
+    <ds:schemaRef ds:uri="http://www.w3.org/XML/1998/namespace"/>
+    <ds:schemaRef ds:uri="aa815ce1-f09d-44ce-9b53-a1c5bdff19c2"/>
     <ds:schemaRef ds:uri="http://schemas.openxmlformats.org/package/2006/metadata/core-properties"/>
-    <ds:schemaRef ds:uri="http://purl.org/dc/dcmitype/"/>
-    <ds:schemaRef ds:uri="aa815ce1-f09d-44ce-9b53-a1c5bdff19c2"/>
-    <ds:schemaRef ds:uri="http://www.w3.org/XML/1998/namespace"/>
   </ds:schemaRefs>
 </ds:datastoreItem>
 </file>
</xml_diff>

<commit_message>
update Javadoc, comments and contribution slide
</commit_message>
<xml_diff>
--- a/WaCar.pptx
+++ b/WaCar.pptx
@@ -376,7 +376,7 @@
           <a:p>
             <a:fld id="{C6EA49A4-F2B3-4A9E-B2D8-2B3CE17CD6AA}" type="slidenum">
               <a:rPr lang="it-IT" smtClean="0"/>
-              <a:t>‹#›</a:t>
+              <a:t>‹N›</a:t>
             </a:fld>
             <a:endParaRPr lang="it-IT"/>
           </a:p>
@@ -742,7 +742,7 @@
           <a:p>
             <a:fld id="{A9EE5928-F148-40B0-A685-C3EA8FBFEFC2}" type="slidenum">
               <a:rPr lang="it-IT" smtClean="0"/>
-              <a:t>‹#›</a:t>
+              <a:t>‹N›</a:t>
             </a:fld>
             <a:endParaRPr lang="it-IT"/>
           </a:p>
@@ -912,7 +912,7 @@
           <a:p>
             <a:fld id="{A9EE5928-F148-40B0-A685-C3EA8FBFEFC2}" type="slidenum">
               <a:rPr lang="it-IT" smtClean="0"/>
-              <a:t>‹#›</a:t>
+              <a:t>‹N›</a:t>
             </a:fld>
             <a:endParaRPr lang="it-IT"/>
           </a:p>
@@ -1092,7 +1092,7 @@
           <a:p>
             <a:fld id="{A9EE5928-F148-40B0-A685-C3EA8FBFEFC2}" type="slidenum">
               <a:rPr lang="it-IT" smtClean="0"/>
-              <a:t>‹#›</a:t>
+              <a:t>‹N›</a:t>
             </a:fld>
             <a:endParaRPr lang="it-IT"/>
           </a:p>
@@ -1262,7 +1262,7 @@
           <a:p>
             <a:fld id="{A9EE5928-F148-40B0-A685-C3EA8FBFEFC2}" type="slidenum">
               <a:rPr lang="it-IT" smtClean="0"/>
-              <a:t>‹#›</a:t>
+              <a:t>‹N›</a:t>
             </a:fld>
             <a:endParaRPr lang="it-IT"/>
           </a:p>
@@ -1508,7 +1508,7 @@
           <a:p>
             <a:fld id="{A9EE5928-F148-40B0-A685-C3EA8FBFEFC2}" type="slidenum">
               <a:rPr lang="it-IT" smtClean="0"/>
-              <a:t>‹#›</a:t>
+              <a:t>‹N›</a:t>
             </a:fld>
             <a:endParaRPr lang="it-IT"/>
           </a:p>
@@ -1740,7 +1740,7 @@
           <a:p>
             <a:fld id="{A9EE5928-F148-40B0-A685-C3EA8FBFEFC2}" type="slidenum">
               <a:rPr lang="it-IT" smtClean="0"/>
-              <a:t>‹#›</a:t>
+              <a:t>‹N›</a:t>
             </a:fld>
             <a:endParaRPr lang="it-IT"/>
           </a:p>
@@ -2107,7 +2107,7 @@
           <a:p>
             <a:fld id="{A9EE5928-F148-40B0-A685-C3EA8FBFEFC2}" type="slidenum">
               <a:rPr lang="it-IT" smtClean="0"/>
-              <a:t>‹#›</a:t>
+              <a:t>‹N›</a:t>
             </a:fld>
             <a:endParaRPr lang="it-IT"/>
           </a:p>
@@ -2225,7 +2225,7 @@
           <a:p>
             <a:fld id="{A9EE5928-F148-40B0-A685-C3EA8FBFEFC2}" type="slidenum">
               <a:rPr lang="it-IT" smtClean="0"/>
-              <a:t>‹#›</a:t>
+              <a:t>‹N›</a:t>
             </a:fld>
             <a:endParaRPr lang="it-IT"/>
           </a:p>
@@ -2320,7 +2320,7 @@
           <a:p>
             <a:fld id="{A9EE5928-F148-40B0-A685-C3EA8FBFEFC2}" type="slidenum">
               <a:rPr lang="it-IT" smtClean="0"/>
-              <a:t>‹#›</a:t>
+              <a:t>‹N›</a:t>
             </a:fld>
             <a:endParaRPr lang="it-IT"/>
           </a:p>
@@ -2597,7 +2597,7 @@
           <a:p>
             <a:fld id="{A9EE5928-F148-40B0-A685-C3EA8FBFEFC2}" type="slidenum">
               <a:rPr lang="it-IT" smtClean="0"/>
-              <a:t>‹#›</a:t>
+              <a:t>‹N›</a:t>
             </a:fld>
             <a:endParaRPr lang="it-IT"/>
           </a:p>
@@ -2854,7 +2854,7 @@
           <a:p>
             <a:fld id="{A9EE5928-F148-40B0-A685-C3EA8FBFEFC2}" type="slidenum">
               <a:rPr lang="it-IT" smtClean="0"/>
-              <a:t>‹#›</a:t>
+              <a:t>‹N›</a:t>
             </a:fld>
             <a:endParaRPr lang="it-IT"/>
           </a:p>
@@ -3103,7 +3103,7 @@
           <a:p>
             <a:fld id="{A9EE5928-F148-40B0-A685-C3EA8FBFEFC2}" type="slidenum">
               <a:rPr lang="it-IT" smtClean="0"/>
-              <a:t>‹#›</a:t>
+              <a:t>‹N›</a:t>
             </a:fld>
             <a:endParaRPr lang="it-IT"/>
           </a:p>
@@ -4979,18 +4979,28 @@
             <a:r>
               <a:rPr lang="it-IT" sz="1800" dirty="0">
                 <a:solidFill>
-                  <a:schemeClr val="bg1"/>
-                </a:solidFill>
-                <a:latin typeface="Audiowide" panose="02000503000000020004" pitchFamily="2" charset="0"/>
-              </a:rPr>
-              <a:t>Di Martino Ludovico: </a:t>
+                  <a:srgbClr val="D76464"/>
+                </a:solidFill>
+                <a:latin typeface="Audiowide" panose="02000503000000020004" pitchFamily="2" charset="0"/>
+              </a:rPr>
+              <a:t>Di Martino Ludovico</a:t>
+            </a:r>
+            <a:r>
+              <a:rPr lang="it-IT" sz="1800" dirty="0">
+                <a:solidFill>
+                  <a:schemeClr val="bg1"/>
+                </a:solidFill>
+                <a:latin typeface="Audiowide" panose="02000503000000020004" pitchFamily="2" charset="0"/>
+              </a:rPr>
+              <a:t>: </a:t>
             </a:r>
             <a:r>
               <a:rPr lang="en-US" sz="1800" dirty="0">
                 <a:solidFill>
                   <a:schemeClr val="bg1"/>
                 </a:solidFill>
-                <a:latin typeface="Audiowide" panose="02000503000000020004" pitchFamily="2" charset="0"/>
+                <a:latin typeface="Arial" panose="020B0604020202020204" pitchFamily="34" charset="0"/>
+                <a:cs typeface="Arial" panose="020B0604020202020204" pitchFamily="34" charset="0"/>
               </a:rPr>
               <a:t>developed the frontend of the admin section and the order recap modal for the basic user. Created and added the favicon and the logo on all the pages of the website.</a:t>
             </a:r>
@@ -4999,17 +5009,196 @@
             <a:r>
               <a:rPr lang="en-US" sz="1800" dirty="0">
                 <a:solidFill>
-                  <a:schemeClr val="bg1"/>
-                </a:solidFill>
-                <a:latin typeface="Audiowide" panose="02000503000000020004" pitchFamily="2" charset="0"/>
-              </a:rPr>
-              <a:t>Scapinello Michele: developed the frontend of the list order page and the delete order modal and servlet. Development of the footer and part of the navbar. Preparation of the slides.</a:t>
+                  <a:srgbClr val="D76464"/>
+                </a:solidFill>
+                <a:latin typeface="Audiowide" panose="02000503000000020004" pitchFamily="2" charset="0"/>
+              </a:rPr>
+              <a:t>Galli Filippo</a:t>
+            </a:r>
+            <a:r>
+              <a:rPr lang="en-US" sz="1800" dirty="0">
+                <a:solidFill>
+                  <a:schemeClr val="bg1"/>
+                </a:solidFill>
+                <a:latin typeface="Audiowide" panose="02000503000000020004" pitchFamily="2" charset="0"/>
+              </a:rPr>
+              <a:t>: </a:t>
+            </a:r>
+            <a:r>
+              <a:rPr lang="en-US" sz="1800" dirty="0">
+                <a:solidFill>
+                  <a:schemeClr val="bg1"/>
+                </a:solidFill>
+                <a:latin typeface="Arial" panose="020B0604020202020204" pitchFamily="34" charset="0"/>
+                <a:cs typeface="Arial" panose="020B0604020202020204" pitchFamily="34" charset="0"/>
+              </a:rPr>
+              <a:t>developed the frontend for the login, the signup and the modify-order modal. Furthermore I have developed the </a:t>
+            </a:r>
+            <a:r>
+              <a:rPr lang="en-US" sz="1800" dirty="0" err="1">
+                <a:solidFill>
+                  <a:schemeClr val="bg1"/>
+                </a:solidFill>
+                <a:latin typeface="Arial" panose="020B0604020202020204" pitchFamily="34" charset="0"/>
+                <a:cs typeface="Arial" panose="020B0604020202020204" pitchFamily="34" charset="0"/>
+              </a:rPr>
+              <a:t>UpdateOrder</a:t>
+            </a:r>
+            <a:r>
+              <a:rPr lang="en-US" sz="1800" dirty="0">
+                <a:solidFill>
+                  <a:schemeClr val="bg1"/>
+                </a:solidFill>
+                <a:latin typeface="Arial" panose="020B0604020202020204" pitchFamily="34" charset="0"/>
+                <a:cs typeface="Arial" panose="020B0604020202020204" pitchFamily="34" charset="0"/>
+              </a:rPr>
+              <a:t> servlet and the navigation bar</a:t>
+            </a:r>
+          </a:p>
+          <a:p>
+            <a:r>
+              <a:rPr lang="en-US" sz="1800" dirty="0">
+                <a:solidFill>
+                  <a:srgbClr val="D76464"/>
+                </a:solidFill>
+                <a:latin typeface="Audiowide" panose="02000503000000020004" pitchFamily="2" charset="0"/>
+              </a:rPr>
+              <a:t>Leonardi Alessandro</a:t>
+            </a:r>
+            <a:r>
+              <a:rPr lang="en-US" sz="1800" dirty="0">
+                <a:solidFill>
+                  <a:schemeClr val="bg1"/>
+                </a:solidFill>
+                <a:latin typeface="Audiowide" panose="02000503000000020004" pitchFamily="2" charset="0"/>
+              </a:rPr>
+              <a:t>: </a:t>
+            </a:r>
+            <a:r>
+              <a:rPr lang="en-US" sz="1800" dirty="0">
+                <a:solidFill>
+                  <a:schemeClr val="bg1"/>
+                </a:solidFill>
+                <a:latin typeface="Arial" panose="020B0604020202020204" pitchFamily="34" charset="0"/>
+                <a:cs typeface="Arial" panose="020B0604020202020204" pitchFamily="34" charset="0"/>
+              </a:rPr>
+              <a:t>developed the frontend of the list </a:t>
+            </a:r>
+            <a:r>
+              <a:rPr lang="en-US" sz="1800" dirty="0" err="1">
+                <a:solidFill>
+                  <a:schemeClr val="bg1"/>
+                </a:solidFill>
+                <a:latin typeface="Arial" panose="020B0604020202020204" pitchFamily="34" charset="0"/>
+                <a:cs typeface="Arial" panose="020B0604020202020204" pitchFamily="34" charset="0"/>
+              </a:rPr>
+              <a:t>favourite</a:t>
+            </a:r>
+            <a:r>
+              <a:rPr lang="en-US" sz="1800" dirty="0">
+                <a:solidFill>
+                  <a:schemeClr val="bg1"/>
+                </a:solidFill>
+                <a:latin typeface="Arial" panose="020B0604020202020204" pitchFamily="34" charset="0"/>
+                <a:cs typeface="Arial" panose="020B0604020202020204" pitchFamily="34" charset="0"/>
+              </a:rPr>
+              <a:t> page. Contributed to the development of the frontend of the list order page.</a:t>
+            </a:r>
+          </a:p>
+          <a:p>
+            <a:r>
+              <a:rPr lang="en-US" sz="1800" dirty="0">
+                <a:solidFill>
+                  <a:srgbClr val="D76464"/>
+                </a:solidFill>
+                <a:latin typeface="Audiowide" panose="02000503000000020004" pitchFamily="2" charset="0"/>
+              </a:rPr>
+              <a:t>Rigobello Manuel</a:t>
+            </a:r>
+            <a:r>
+              <a:rPr lang="en-US" sz="1800" dirty="0">
+                <a:solidFill>
+                  <a:schemeClr val="bg1"/>
+                </a:solidFill>
+                <a:latin typeface="Audiowide" panose="02000503000000020004" pitchFamily="2" charset="0"/>
+              </a:rPr>
+              <a:t>: </a:t>
+            </a:r>
+            <a:r>
+              <a:rPr lang="en-US" sz="1800" dirty="0">
+                <a:solidFill>
+                  <a:schemeClr val="bg1"/>
+                </a:solidFill>
+                <a:latin typeface="Arial" panose="020B0604020202020204" pitchFamily="34" charset="0"/>
+                <a:cs typeface="Arial" panose="020B0604020202020204" pitchFamily="34" charset="0"/>
+              </a:rPr>
+              <a:t>developed the frontend of the list car, list circuit, their modals (with “edit” handling for the admin) and their respective REST. Developed the frontend of the create order page (no recap modal), the REST for getting the circuits based on the </a:t>
+            </a:r>
+            <a:r>
+              <a:rPr lang="en-US" sz="1800" dirty="0" err="1">
+                <a:solidFill>
+                  <a:schemeClr val="bg1"/>
+                </a:solidFill>
+                <a:latin typeface="Arial" panose="020B0604020202020204" pitchFamily="34" charset="0"/>
+                <a:cs typeface="Arial" panose="020B0604020202020204" pitchFamily="34" charset="0"/>
+              </a:rPr>
+              <a:t>carType</a:t>
+            </a:r>
+            <a:r>
+              <a:rPr lang="en-US" sz="1800" dirty="0">
+                <a:solidFill>
+                  <a:schemeClr val="bg1"/>
+                </a:solidFill>
+                <a:latin typeface="Arial" panose="020B0604020202020204" pitchFamily="34" charset="0"/>
+                <a:cs typeface="Arial" panose="020B0604020202020204" pitchFamily="34" charset="0"/>
+              </a:rPr>
+              <a:t> and the second modal with success/error message (error can arrive from PostgreSQL trigger). Developed the basic user Authentication header with BASIC authorization</a:t>
+            </a:r>
+            <a:r>
+              <a:rPr lang="en-US" sz="1800" dirty="0">
+                <a:solidFill>
+                  <a:schemeClr val="bg1"/>
+                </a:solidFill>
+                <a:latin typeface="Audiowide" panose="02000503000000020004" pitchFamily="2" charset="0"/>
+              </a:rPr>
+              <a:t>.</a:t>
+            </a:r>
+          </a:p>
+          <a:p>
+            <a:r>
+              <a:rPr lang="en-US" sz="1800" dirty="0">
+                <a:solidFill>
+                  <a:srgbClr val="D76464"/>
+                </a:solidFill>
+                <a:latin typeface="Audiowide" panose="02000503000000020004" pitchFamily="2" charset="0"/>
+              </a:rPr>
+              <a:t>Scapinello Michele</a:t>
+            </a:r>
+            <a:r>
+              <a:rPr lang="en-US" sz="1800" dirty="0">
+                <a:solidFill>
+                  <a:schemeClr val="bg1"/>
+                </a:solidFill>
+                <a:latin typeface="Audiowide" panose="02000503000000020004" pitchFamily="2" charset="0"/>
+              </a:rPr>
+              <a:t>: </a:t>
+            </a:r>
+            <a:r>
+              <a:rPr lang="en-US" sz="1800" dirty="0">
+                <a:solidFill>
+                  <a:schemeClr val="bg1"/>
+                </a:solidFill>
+                <a:latin typeface="Arial" panose="020B0604020202020204" pitchFamily="34" charset="0"/>
+                <a:cs typeface="Arial" panose="020B0604020202020204" pitchFamily="34" charset="0"/>
+              </a:rPr>
+              <a:t>developed the frontend of the list order page and the delete order modal and servlet. Development of the footer and part of the navbar. Preparation of the slides.</a:t>
             </a:r>
             <a:endParaRPr lang="it-IT" sz="1800" dirty="0">
               <a:solidFill>
                 <a:schemeClr val="bg1"/>
               </a:solidFill>
-              <a:latin typeface="Audiowide" panose="02000503000000020004" pitchFamily="2" charset="0"/>
+              <a:latin typeface="Arial" panose="020B0604020202020204" pitchFamily="34" charset="0"/>
+              <a:cs typeface="Arial" panose="020B0604020202020204" pitchFamily="34" charset="0"/>
             </a:endParaRPr>
           </a:p>
         </p:txBody>
@@ -6970,7 +7159,7 @@
             <p:ph idx="1"/>
             <p:extLst>
               <p:ext uri="{D42A27DB-BD31-4B8C-83A1-F6EECF244321}">
-                <p14:modId xmlns:p14="http://schemas.microsoft.com/office/powerpoint/2010/main" val="3531234753"/>
+                <p14:modId xmlns:p14="http://schemas.microsoft.com/office/powerpoint/2010/main" val="1899326551"/>
               </p:ext>
             </p:extLst>
           </p:nvPr>
@@ -7587,7 +7776,7 @@
                       </a:r>
                       <a:r>
                         <a:rPr lang="it-IT" dirty="0" err="1"/>
-                        <a:t>favoruites</a:t>
+                        <a:t>favoruite</a:t>
                       </a:r>
                       <a:r>
                         <a:rPr lang="it-IT" dirty="0"/>
@@ -7605,7 +7794,18 @@
                         <a:rPr lang="it-IT" dirty="0" err="1"/>
                         <a:t>values</a:t>
                       </a:r>
-                      <a:endParaRPr lang="it-IT" dirty="0"/>
+                      <a:r>
+                        <a:rPr lang="it-IT" dirty="0"/>
+                        <a:t> of the </a:t>
+                      </a:r>
+                      <a:r>
+                        <a:rPr lang="it-IT" dirty="0" err="1"/>
+                        <a:t>logged</a:t>
+                      </a:r>
+                      <a:r>
+                        <a:rPr lang="it-IT" dirty="0"/>
+                        <a:t> in user</a:t>
+                      </a:r>
                     </a:p>
                   </a:txBody>
                   <a:tcPr/>
@@ -11214,6 +11414,15 @@
 </file>
 
 <file path=customXml/item1.xml><?xml version="1.0" encoding="utf-8"?>
+<?mso-contentType ?>
+<FormTemplates xmlns="http://schemas.microsoft.com/sharepoint/v3/contenttype/forms">
+  <Display>DocumentLibraryForm</Display>
+  <Edit>DocumentLibraryForm</Edit>
+  <New>DocumentLibraryForm</New>
+</FormTemplates>
+</file>
+
+<file path=customXml/item2.xml><?xml version="1.0" encoding="utf-8"?>
 <ct:contentTypeSchema xmlns:ct="http://schemas.microsoft.com/office/2006/metadata/contentType" xmlns:ma="http://schemas.microsoft.com/office/2006/metadata/properties/metaAttributes" ct:_="" ma:_="" ma:contentTypeName="Documento" ma:contentTypeID="0x0101002A534966C3A1194B904DA8ABF2BCE99D" ma:contentTypeVersion="14" ma:contentTypeDescription="Creare un nuovo documento." ma:contentTypeScope="" ma:versionID="2c215e7b8c705f17b458c052c091c32f">
   <xsd:schema xmlns:xsd="http://www.w3.org/2001/XMLSchema" xmlns:xs="http://www.w3.org/2001/XMLSchema" xmlns:p="http://schemas.microsoft.com/office/2006/metadata/properties" xmlns:ns3="aa815ce1-f09d-44ce-9b53-a1c5bdff19c2" targetNamespace="http://schemas.microsoft.com/office/2006/metadata/properties" ma:root="true" ma:fieldsID="263251a6e06b0b6a6232f0a9b9c6cba6" ns3:_="">
     <xsd:import namespace="aa815ce1-f09d-44ce-9b53-a1c5bdff19c2"/>
@@ -11421,15 +11630,6 @@
 </ct:contentTypeSchema>
 </file>
 
-<file path=customXml/item2.xml><?xml version="1.0" encoding="utf-8"?>
-<?mso-contentType ?>
-<FormTemplates xmlns="http://schemas.microsoft.com/sharepoint/v3/contenttype/forms">
-  <Display>DocumentLibraryForm</Display>
-  <Edit>DocumentLibraryForm</Edit>
-  <New>DocumentLibraryForm</New>
-</FormTemplates>
-</file>
-
 <file path=customXml/item3.xml><?xml version="1.0" encoding="utf-8"?>
 <p:properties xmlns:p="http://schemas.microsoft.com/office/2006/metadata/properties" xmlns:xsi="http://www.w3.org/2001/XMLSchema-instance" xmlns:pc="http://schemas.microsoft.com/office/infopath/2007/PartnerControls">
   <documentManagement>
@@ -11439,6 +11639,14 @@
 </file>
 
 <file path=customXml/itemProps1.xml><?xml version="1.0" encoding="utf-8"?>
+<ds:datastoreItem xmlns:ds="http://schemas.openxmlformats.org/officeDocument/2006/customXml" ds:itemID="{2730C931-C2C9-4027-8E3C-8BF3CFFB5AB7}">
+  <ds:schemaRefs>
+    <ds:schemaRef ds:uri="http://schemas.microsoft.com/sharepoint/v3/contenttype/forms"/>
+  </ds:schemaRefs>
+</ds:datastoreItem>
+</file>
+
+<file path=customXml/itemProps2.xml><?xml version="1.0" encoding="utf-8"?>
 <ds:datastoreItem xmlns:ds="http://schemas.openxmlformats.org/officeDocument/2006/customXml" ds:itemID="{C3608691-813B-4BA6-A7F9-FF976B2983FD}">
   <ds:schemaRefs>
     <ds:schemaRef ds:uri="http://schemas.microsoft.com/office/2006/metadata/contentType"/>
@@ -11452,14 +11660,6 @@
     <ds:schemaRef ds:uri="http://purl.org/dc/elements/1.1/"/>
     <ds:schemaRef ds:uri="http://purl.org/dc/terms/"/>
     <ds:schemaRef ds:uri="http://schemas.microsoft.com/internal/obd"/>
-  </ds:schemaRefs>
-</ds:datastoreItem>
-</file>
-
-<file path=customXml/itemProps2.xml><?xml version="1.0" encoding="utf-8"?>
-<ds:datastoreItem xmlns:ds="http://schemas.openxmlformats.org/officeDocument/2006/customXml" ds:itemID="{2730C931-C2C9-4027-8E3C-8BF3CFFB5AB7}">
-  <ds:schemaRefs>
-    <ds:schemaRef ds:uri="http://schemas.microsoft.com/sharepoint/v3/contenttype/forms"/>
   </ds:schemaRefs>
 </ds:datastoreItem>
 </file>

</xml_diff>